<commit_message>
Improved letters for referencing in figures.
</commit_message>
<xml_diff>
--- a/chapter_07/figures/verif_overall_scores.pptx
+++ b/chapter_07/figures/verif_overall_scores.pptx
@@ -6,7 +6,6 @@
   </p:sldMasterIdLst>
   <p:sldIdLst>
     <p:sldId id="256" r:id="rId2"/>
-    <p:sldId id="257" r:id="rId3"/>
   </p:sldIdLst>
   <p:sldSz cx="4140200" cy="2339975"/>
   <p:notesSz cx="6858000" cy="9144000"/>
@@ -105,13 +104,18 @@
       </a:defRPr>
     </a:lvl9pPr>
   </p:defaultTextStyle>
+  <p:extLst>
+    <p:ext uri="{EFAFB233-063F-42B5-8137-9DF3F51BA10A}">
+      <p15:sldGuideLst xmlns:p15="http://schemas.microsoft.com/office/powerpoint/2012/main"/>
+    </p:ext>
+  </p:extLst>
 </p:presentation>
 </file>
 
 <file path=ppt/revisionInfo.xml><?xml version="1.0" encoding="utf-8"?>
 <p1510:revInfo xmlns:a="http://schemas.openxmlformats.org/drawingml/2006/main" xmlns:r="http://schemas.openxmlformats.org/officeDocument/2006/relationships" xmlns:p1510="http://schemas.microsoft.com/office/powerpoint/2015/10/main">
   <p1510:revLst>
-    <p1510:client id="{FDA0979D-FCF3-48BF-A18D-D5D049DAD263}" v="6" dt="2025-07-10T08:52:37.167"/>
+    <p1510:client id="{FDA0979D-FCF3-48BF-A18D-D5D049DAD263}" v="12" dt="2025-07-10T11:10:23.016"/>
   </p1510:revLst>
 </p1510:revInfo>
 </file>
@@ -120,17 +124,41 @@
 <pc:chgInfo xmlns:a="http://schemas.openxmlformats.org/drawingml/2006/main" xmlns:r="http://schemas.openxmlformats.org/officeDocument/2006/relationships" xmlns:ac="http://schemas.microsoft.com/office/drawing/2013/main/command" xmlns:pc="http://schemas.microsoft.com/office/powerpoint/2013/main/command">
   <pc:docChgLst>
     <pc:chgData name="Fatima Pillosu" userId="a6295d4dc9e22643" providerId="LiveId" clId="{FDA0979D-FCF3-48BF-A18D-D5D049DAD263}"/>
-    <pc:docChg chg="undo custSel modSld">
-      <pc:chgData name="Fatima Pillosu" userId="a6295d4dc9e22643" providerId="LiveId" clId="{FDA0979D-FCF3-48BF-A18D-D5D049DAD263}" dt="2025-07-10T08:52:58.291" v="340" actId="1035"/>
+    <pc:docChg chg="undo custSel delSld modSld">
+      <pc:chgData name="Fatima Pillosu" userId="a6295d4dc9e22643" providerId="LiveId" clId="{FDA0979D-FCF3-48BF-A18D-D5D049DAD263}" dt="2025-07-10T11:10:31.113" v="383" actId="20577"/>
       <pc:docMkLst>
         <pc:docMk/>
       </pc:docMkLst>
       <pc:sldChg chg="addSp delSp modSp mod">
-        <pc:chgData name="Fatima Pillosu" userId="a6295d4dc9e22643" providerId="LiveId" clId="{FDA0979D-FCF3-48BF-A18D-D5D049DAD263}" dt="2025-07-10T08:52:58.291" v="340" actId="1035"/>
+        <pc:chgData name="Fatima Pillosu" userId="a6295d4dc9e22643" providerId="LiveId" clId="{FDA0979D-FCF3-48BF-A18D-D5D049DAD263}" dt="2025-07-10T11:10:31.113" v="383" actId="20577"/>
         <pc:sldMkLst>
           <pc:docMk/>
           <pc:sldMk cId="3829304072" sldId="256"/>
         </pc:sldMkLst>
+        <pc:spChg chg="add mod">
+          <ac:chgData name="Fatima Pillosu" userId="a6295d4dc9e22643" providerId="LiveId" clId="{FDA0979D-FCF3-48BF-A18D-D5D049DAD263}" dt="2025-07-10T10:57:26.363" v="352" actId="554"/>
+          <ac:spMkLst>
+            <pc:docMk/>
+            <pc:sldMk cId="3829304072" sldId="256"/>
+            <ac:spMk id="2" creationId="{56D055BF-299F-2498-48AD-DF90FC7D5205}"/>
+          </ac:spMkLst>
+        </pc:spChg>
+        <pc:spChg chg="add mod">
+          <ac:chgData name="Fatima Pillosu" userId="a6295d4dc9e22643" providerId="LiveId" clId="{FDA0979D-FCF3-48BF-A18D-D5D049DAD263}" dt="2025-07-10T10:57:38.072" v="353" actId="1076"/>
+          <ac:spMkLst>
+            <pc:docMk/>
+            <pc:sldMk cId="3829304072" sldId="256"/>
+            <ac:spMk id="3" creationId="{48B1BB4E-6C4E-428B-1CAA-32551A7D637F}"/>
+          </ac:spMkLst>
+        </pc:spChg>
+        <pc:spChg chg="add mod">
+          <ac:chgData name="Fatima Pillosu" userId="a6295d4dc9e22643" providerId="LiveId" clId="{FDA0979D-FCF3-48BF-A18D-D5D049DAD263}" dt="2025-07-10T10:57:42.495" v="354" actId="1076"/>
+          <ac:spMkLst>
+            <pc:docMk/>
+            <pc:sldMk cId="3829304072" sldId="256"/>
+            <ac:spMk id="4" creationId="{6A86CF01-D0E3-F046-5F1A-335B8A751FF9}"/>
+          </ac:spMkLst>
+        </pc:spChg>
         <pc:spChg chg="del">
           <ac:chgData name="Fatima Pillosu" userId="a6295d4dc9e22643" providerId="LiveId" clId="{FDA0979D-FCF3-48BF-A18D-D5D049DAD263}" dt="2025-07-10T08:45:27.152" v="2" actId="21"/>
           <ac:spMkLst>
@@ -139,6 +167,22 @@
             <ac:spMk id="5" creationId="{9871467D-0D41-3DE2-7548-6C7AC226404F}"/>
           </ac:spMkLst>
         </pc:spChg>
+        <pc:spChg chg="add mod">
+          <ac:chgData name="Fatima Pillosu" userId="a6295d4dc9e22643" providerId="LiveId" clId="{FDA0979D-FCF3-48BF-A18D-D5D049DAD263}" dt="2025-07-10T11:10:05.905" v="371" actId="1035"/>
+          <ac:spMkLst>
+            <pc:docMk/>
+            <pc:sldMk cId="3829304072" sldId="256"/>
+            <ac:spMk id="5" creationId="{C28FD63F-BB9E-AD69-71B9-B973AD33F83F}"/>
+          </ac:spMkLst>
+        </pc:spChg>
+        <pc:spChg chg="add mod">
+          <ac:chgData name="Fatima Pillosu" userId="a6295d4dc9e22643" providerId="LiveId" clId="{FDA0979D-FCF3-48BF-A18D-D5D049DAD263}" dt="2025-07-10T11:10:18.835" v="379" actId="20577"/>
+          <ac:spMkLst>
+            <pc:docMk/>
+            <pc:sldMk cId="3829304072" sldId="256"/>
+            <ac:spMk id="6" creationId="{36457D3F-8BF8-12D2-AF79-76238B803265}"/>
+          </ac:spMkLst>
+        </pc:spChg>
         <pc:spChg chg="del">
           <ac:chgData name="Fatima Pillosu" userId="a6295d4dc9e22643" providerId="LiveId" clId="{FDA0979D-FCF3-48BF-A18D-D5D049DAD263}" dt="2025-07-10T08:45:27.152" v="2" actId="21"/>
           <ac:spMkLst>
@@ -147,6 +191,14 @@
             <ac:spMk id="7" creationId="{8A1DCA13-5A05-B0DA-DC5F-7F04552704C2}"/>
           </ac:spMkLst>
         </pc:spChg>
+        <pc:spChg chg="add mod">
+          <ac:chgData name="Fatima Pillosu" userId="a6295d4dc9e22643" providerId="LiveId" clId="{FDA0979D-FCF3-48BF-A18D-D5D049DAD263}" dt="2025-07-10T11:10:31.113" v="383" actId="20577"/>
+          <ac:spMkLst>
+            <pc:docMk/>
+            <pc:sldMk cId="3829304072" sldId="256"/>
+            <ac:spMk id="7" creationId="{BFAC298E-30EC-6611-2990-7CB80A58CA76}"/>
+          </ac:spMkLst>
+        </pc:spChg>
         <pc:spChg chg="del">
           <ac:chgData name="Fatima Pillosu" userId="a6295d4dc9e22643" providerId="LiveId" clId="{FDA0979D-FCF3-48BF-A18D-D5D049DAD263}" dt="2025-07-10T08:45:27.152" v="2" actId="21"/>
           <ac:spMkLst>
@@ -596,7 +648,7 @@
           </ac:spMkLst>
         </pc:spChg>
         <pc:spChg chg="add mod">
-          <ac:chgData name="Fatima Pillosu" userId="a6295d4dc9e22643" providerId="LiveId" clId="{FDA0979D-FCF3-48BF-A18D-D5D049DAD263}" dt="2025-07-10T08:52:42.157" v="338" actId="1036"/>
+          <ac:chgData name="Fatima Pillosu" userId="a6295d4dc9e22643" providerId="LiveId" clId="{FDA0979D-FCF3-48BF-A18D-D5D049DAD263}" dt="2025-07-10T11:01:30.714" v="355"/>
           <ac:spMkLst>
             <pc:docMk/>
             <pc:sldMk cId="3829304072" sldId="256"/>
@@ -812,7 +864,7 @@
           </ac:spMkLst>
         </pc:spChg>
         <pc:spChg chg="add mod">
-          <ac:chgData name="Fatima Pillosu" userId="a6295d4dc9e22643" providerId="LiveId" clId="{FDA0979D-FCF3-48BF-A18D-D5D049DAD263}" dt="2025-07-10T08:52:58.291" v="340" actId="1035"/>
+          <ac:chgData name="Fatima Pillosu" userId="a6295d4dc9e22643" providerId="LiveId" clId="{FDA0979D-FCF3-48BF-A18D-D5D049DAD263}" dt="2025-07-10T11:09:19.830" v="367" actId="20577"/>
           <ac:spMkLst>
             <pc:docMk/>
             <pc:sldMk cId="3829304072" sldId="256"/>
@@ -1531,6 +1583,13 @@
             <ac:cxnSpMk id="220" creationId="{A743AA55-0FF7-4322-F12E-5506ECD3A12B}"/>
           </ac:cxnSpMkLst>
         </pc:cxnChg>
+      </pc:sldChg>
+      <pc:sldChg chg="del">
+        <pc:chgData name="Fatima Pillosu" userId="a6295d4dc9e22643" providerId="LiveId" clId="{FDA0979D-FCF3-48BF-A18D-D5D049DAD263}" dt="2025-07-10T10:56:40.860" v="341" actId="47"/>
+        <pc:sldMkLst>
+          <pc:docMk/>
+          <pc:sldMk cId="494028979" sldId="257"/>
+        </pc:sldMkLst>
       </pc:sldChg>
     </pc:docChg>
   </pc:docChgLst>
@@ -1668,7 +1727,7 @@
           <a:p>
             <a:fld id="{CE8B4338-5D18-4C46-BB4C-6A795A89FFCB}" type="datetimeFigureOut">
               <a:rPr lang="en-GB" smtClean="0"/>
-              <a:t>09/07/2025</a:t>
+              <a:t>10/07/2025</a:t>
             </a:fld>
             <a:endParaRPr lang="en-GB"/>
           </a:p>
@@ -1838,7 +1897,7 @@
           <a:p>
             <a:fld id="{CE8B4338-5D18-4C46-BB4C-6A795A89FFCB}" type="datetimeFigureOut">
               <a:rPr lang="en-GB" smtClean="0"/>
-              <a:t>09/07/2025</a:t>
+              <a:t>10/07/2025</a:t>
             </a:fld>
             <a:endParaRPr lang="en-GB"/>
           </a:p>
@@ -2018,7 +2077,7 @@
           <a:p>
             <a:fld id="{CE8B4338-5D18-4C46-BB4C-6A795A89FFCB}" type="datetimeFigureOut">
               <a:rPr lang="en-GB" smtClean="0"/>
-              <a:t>09/07/2025</a:t>
+              <a:t>10/07/2025</a:t>
             </a:fld>
             <a:endParaRPr lang="en-GB"/>
           </a:p>
@@ -2188,7 +2247,7 @@
           <a:p>
             <a:fld id="{CE8B4338-5D18-4C46-BB4C-6A795A89FFCB}" type="datetimeFigureOut">
               <a:rPr lang="en-GB" smtClean="0"/>
-              <a:t>09/07/2025</a:t>
+              <a:t>10/07/2025</a:t>
             </a:fld>
             <a:endParaRPr lang="en-GB"/>
           </a:p>
@@ -2434,7 +2493,7 @@
           <a:p>
             <a:fld id="{CE8B4338-5D18-4C46-BB4C-6A795A89FFCB}" type="datetimeFigureOut">
               <a:rPr lang="en-GB" smtClean="0"/>
-              <a:t>09/07/2025</a:t>
+              <a:t>10/07/2025</a:t>
             </a:fld>
             <a:endParaRPr lang="en-GB"/>
           </a:p>
@@ -2666,7 +2725,7 @@
           <a:p>
             <a:fld id="{CE8B4338-5D18-4C46-BB4C-6A795A89FFCB}" type="datetimeFigureOut">
               <a:rPr lang="en-GB" smtClean="0"/>
-              <a:t>09/07/2025</a:t>
+              <a:t>10/07/2025</a:t>
             </a:fld>
             <a:endParaRPr lang="en-GB"/>
           </a:p>
@@ -3033,7 +3092,7 @@
           <a:p>
             <a:fld id="{CE8B4338-5D18-4C46-BB4C-6A795A89FFCB}" type="datetimeFigureOut">
               <a:rPr lang="en-GB" smtClean="0"/>
-              <a:t>09/07/2025</a:t>
+              <a:t>10/07/2025</a:t>
             </a:fld>
             <a:endParaRPr lang="en-GB"/>
           </a:p>
@@ -3151,7 +3210,7 @@
           <a:p>
             <a:fld id="{CE8B4338-5D18-4C46-BB4C-6A795A89FFCB}" type="datetimeFigureOut">
               <a:rPr lang="en-GB" smtClean="0"/>
-              <a:t>09/07/2025</a:t>
+              <a:t>10/07/2025</a:t>
             </a:fld>
             <a:endParaRPr lang="en-GB"/>
           </a:p>
@@ -3246,7 +3305,7 @@
           <a:p>
             <a:fld id="{CE8B4338-5D18-4C46-BB4C-6A795A89FFCB}" type="datetimeFigureOut">
               <a:rPr lang="en-GB" smtClean="0"/>
-              <a:t>09/07/2025</a:t>
+              <a:t>10/07/2025</a:t>
             </a:fld>
             <a:endParaRPr lang="en-GB"/>
           </a:p>
@@ -3523,7 +3582,7 @@
           <a:p>
             <a:fld id="{CE8B4338-5D18-4C46-BB4C-6A795A89FFCB}" type="datetimeFigureOut">
               <a:rPr lang="en-GB" smtClean="0"/>
-              <a:t>09/07/2025</a:t>
+              <a:t>10/07/2025</a:t>
             </a:fld>
             <a:endParaRPr lang="en-GB"/>
           </a:p>
@@ -3780,7 +3839,7 @@
           <a:p>
             <a:fld id="{CE8B4338-5D18-4C46-BB4C-6A795A89FFCB}" type="datetimeFigureOut">
               <a:rPr lang="en-GB" smtClean="0"/>
-              <a:t>09/07/2025</a:t>
+              <a:t>10/07/2025</a:t>
             </a:fld>
             <a:endParaRPr lang="en-GB"/>
           </a:p>
@@ -3993,7 +4052,7 @@
           <a:p>
             <a:fld id="{CE8B4338-5D18-4C46-BB4C-6A795A89FFCB}" type="datetimeFigureOut">
               <a:rPr lang="en-GB" smtClean="0"/>
-              <a:t>09/07/2025</a:t>
+              <a:t>10/07/2025</a:t>
             </a:fld>
             <a:endParaRPr lang="en-GB"/>
           </a:p>
@@ -4529,7 +4588,30 @@
                 <a:latin typeface="Calibri Light" panose="020F0302020204030204" pitchFamily="34" charset="0"/>
                 <a:cs typeface="Calibri Light" panose="020F0302020204030204" pitchFamily="34" charset="0"/>
               </a:rPr>
-              <a:t>For the </a:t>
+              <a:t>Evaluated over the </a:t>
+            </a:r>
+            <a:r>
+              <a:rPr lang="en-GB" sz="1000" b="1" dirty="0">
+                <a:solidFill>
+                  <a:srgbClr val="00B0F0"/>
+                </a:solidFill>
+                <a:latin typeface="Calibri" panose="020F0502020204030204" pitchFamily="34" charset="0"/>
+                <a:cs typeface="Calibri" panose="020F0502020204030204" pitchFamily="34" charset="0"/>
+              </a:rPr>
+              <a:t>verification</a:t>
+            </a:r>
+            <a:r>
+              <a:rPr lang="en-GB" sz="1000" dirty="0">
+                <a:solidFill>
+                  <a:schemeClr val="tx1">
+                    <a:lumMod val="75000"/>
+                    <a:lumOff val="25000"/>
+                  </a:schemeClr>
+                </a:solidFill>
+                <a:latin typeface="Calibri Light" panose="020F0302020204030204" pitchFamily="34" charset="0"/>
+                <a:cs typeface="Calibri Light" panose="020F0302020204030204" pitchFamily="34" charset="0"/>
+              </a:rPr>
+              <a:t> dataset, for the </a:t>
             </a:r>
             <a:r>
               <a:rPr lang="en-GB" sz="1000" u="sng" dirty="0">
@@ -4544,19 +4626,16 @@
               </a:rPr>
               <a:t>XGBoost implementation of gradient boosting</a:t>
             </a:r>
-            <a:r>
-              <a:rPr lang="en-GB" sz="1000" dirty="0">
-                <a:solidFill>
-                  <a:schemeClr val="tx1">
-                    <a:lumMod val="75000"/>
-                    <a:lumOff val="25000"/>
-                  </a:schemeClr>
-                </a:solidFill>
-                <a:latin typeface="Calibri Light" panose="020F0302020204030204" pitchFamily="34" charset="0"/>
-                <a:cs typeface="Calibri Light" panose="020F0302020204030204" pitchFamily="34" charset="0"/>
-              </a:rPr>
-              <a:t>, trained with loss function for balanced datasets and hyperparameters optimised maximising  AUC-ROC</a:t>
-            </a:r>
+            <a:endParaRPr lang="en-GB" sz="1000" dirty="0">
+              <a:solidFill>
+                <a:schemeClr val="tx1">
+                  <a:lumMod val="75000"/>
+                  <a:lumOff val="25000"/>
+                </a:schemeClr>
+              </a:solidFill>
+              <a:latin typeface="Calibri Light" panose="020F0302020204030204" pitchFamily="34" charset="0"/>
+              <a:cs typeface="Calibri Light" panose="020F0302020204030204" pitchFamily="34" charset="0"/>
+            </a:endParaRPr>
           </a:p>
         </p:txBody>
       </p:sp>
@@ -7362,32 +7441,6 @@
               <a:t>Scores computed with the full training dataset</a:t>
             </a:r>
           </a:p>
-          <a:p>
-            <a:pPr algn="ctr"/>
-            <a:r>
-              <a:rPr lang="en-US" sz="800" dirty="0">
-                <a:solidFill>
-                  <a:schemeClr val="tx1">
-                    <a:lumMod val="75000"/>
-                    <a:lumOff val="25000"/>
-                  </a:schemeClr>
-                </a:solidFill>
-                <a:latin typeface="Calibri Light" panose="020F0302020204030204" pitchFamily="34" charset="0"/>
-                <a:cs typeface="Calibri Light" panose="020F0302020204030204" pitchFamily="34" charset="0"/>
-              </a:rPr>
-              <a:t>(refer to Figure 6.11)</a:t>
-            </a:r>
-            <a:endParaRPr lang="en-GB" sz="800" dirty="0">
-              <a:solidFill>
-                <a:schemeClr val="tx1">
-                  <a:lumMod val="75000"/>
-                  <a:lumOff val="25000"/>
-                </a:schemeClr>
-              </a:solidFill>
-              <a:latin typeface="Calibri Light" panose="020F0302020204030204" pitchFamily="34" charset="0"/>
-              <a:cs typeface="Calibri Light" panose="020F0302020204030204" pitchFamily="34" charset="0"/>
-            </a:endParaRPr>
-          </a:p>
         </p:txBody>
       </p:sp>
       <p:cxnSp>
@@ -7550,40 +7603,389 @@
           </a:fontRef>
         </p:style>
       </p:cxnSp>
+      <p:sp>
+        <p:nvSpPr>
+          <p:cNvPr id="2" name="TextBox 1">
+            <a:extLst>
+              <a:ext uri="{FF2B5EF4-FFF2-40B4-BE49-F238E27FC236}">
+                <a16:creationId xmlns:a16="http://schemas.microsoft.com/office/drawing/2014/main" id="{56D055BF-299F-2498-48AD-DF90FC7D5205}"/>
+              </a:ext>
+            </a:extLst>
+          </p:cNvPr>
+          <p:cNvSpPr txBox="1"/>
+          <p:nvPr/>
+        </p:nvSpPr>
+        <p:spPr>
+          <a:xfrm>
+            <a:off x="990410" y="1216872"/>
+            <a:ext cx="216000" cy="215444"/>
+          </a:xfrm>
+          <a:prstGeom prst="rect">
+            <a:avLst/>
+          </a:prstGeom>
+          <a:noFill/>
+          <a:ln w="3175">
+            <a:solidFill>
+              <a:schemeClr val="tx1">
+                <a:lumMod val="75000"/>
+                <a:lumOff val="25000"/>
+              </a:schemeClr>
+            </a:solidFill>
+          </a:ln>
+        </p:spPr>
+        <p:txBody>
+          <a:bodyPr wrap="none" rtlCol="0">
+            <a:spAutoFit/>
+          </a:bodyPr>
+          <a:lstStyle/>
+          <a:p>
+            <a:r>
+              <a:rPr lang="en-US" sz="800" dirty="0">
+                <a:latin typeface="Calibri Light" panose="020F0302020204030204" pitchFamily="34" charset="0"/>
+                <a:cs typeface="Calibri Light" panose="020F0302020204030204" pitchFamily="34" charset="0"/>
+              </a:rPr>
+              <a:t>a</a:t>
+            </a:r>
+            <a:endParaRPr lang="en-GB" sz="800" dirty="0">
+              <a:latin typeface="Calibri Light" panose="020F0302020204030204" pitchFamily="34" charset="0"/>
+              <a:cs typeface="Calibri Light" panose="020F0302020204030204" pitchFamily="34" charset="0"/>
+            </a:endParaRPr>
+          </a:p>
+        </p:txBody>
+      </p:sp>
+      <p:sp>
+        <p:nvSpPr>
+          <p:cNvPr id="3" name="TextBox 2">
+            <a:extLst>
+              <a:ext uri="{FF2B5EF4-FFF2-40B4-BE49-F238E27FC236}">
+                <a16:creationId xmlns:a16="http://schemas.microsoft.com/office/drawing/2014/main" id="{48B1BB4E-6C4E-428B-1CAA-32551A7D637F}"/>
+              </a:ext>
+            </a:extLst>
+          </p:cNvPr>
+          <p:cNvSpPr txBox="1"/>
+          <p:nvPr/>
+        </p:nvSpPr>
+        <p:spPr>
+          <a:xfrm>
+            <a:off x="2410356" y="1189292"/>
+            <a:ext cx="237566" cy="215444"/>
+          </a:xfrm>
+          <a:prstGeom prst="rect">
+            <a:avLst/>
+          </a:prstGeom>
+          <a:noFill/>
+          <a:ln w="3175">
+            <a:solidFill>
+              <a:schemeClr val="tx1">
+                <a:lumMod val="75000"/>
+                <a:lumOff val="25000"/>
+              </a:schemeClr>
+            </a:solidFill>
+          </a:ln>
+        </p:spPr>
+        <p:txBody>
+          <a:bodyPr wrap="none" rtlCol="0">
+            <a:spAutoFit/>
+          </a:bodyPr>
+          <a:lstStyle/>
+          <a:p>
+            <a:r>
+              <a:rPr lang="en-US" sz="800" dirty="0">
+                <a:latin typeface="Calibri Light" panose="020F0302020204030204" pitchFamily="34" charset="0"/>
+                <a:cs typeface="Calibri Light" panose="020F0302020204030204" pitchFamily="34" charset="0"/>
+              </a:rPr>
+              <a:t>b</a:t>
+            </a:r>
+            <a:endParaRPr lang="en-GB" sz="800" dirty="0">
+              <a:latin typeface="Calibri Light" panose="020F0302020204030204" pitchFamily="34" charset="0"/>
+              <a:cs typeface="Calibri Light" panose="020F0302020204030204" pitchFamily="34" charset="0"/>
+            </a:endParaRPr>
+          </a:p>
+        </p:txBody>
+      </p:sp>
+      <p:sp>
+        <p:nvSpPr>
+          <p:cNvPr id="4" name="TextBox 3">
+            <a:extLst>
+              <a:ext uri="{FF2B5EF4-FFF2-40B4-BE49-F238E27FC236}">
+                <a16:creationId xmlns:a16="http://schemas.microsoft.com/office/drawing/2014/main" id="{6A86CF01-D0E3-F046-5F1A-335B8A751FF9}"/>
+              </a:ext>
+            </a:extLst>
+          </p:cNvPr>
+          <p:cNvSpPr txBox="1"/>
+          <p:nvPr/>
+        </p:nvSpPr>
+        <p:spPr>
+          <a:xfrm>
+            <a:off x="3848516" y="1196375"/>
+            <a:ext cx="227948" cy="215444"/>
+          </a:xfrm>
+          <a:prstGeom prst="rect">
+            <a:avLst/>
+          </a:prstGeom>
+          <a:noFill/>
+          <a:ln w="3175">
+            <a:solidFill>
+              <a:schemeClr val="tx1">
+                <a:lumMod val="75000"/>
+                <a:lumOff val="25000"/>
+              </a:schemeClr>
+            </a:solidFill>
+          </a:ln>
+        </p:spPr>
+        <p:txBody>
+          <a:bodyPr wrap="none" rtlCol="0">
+            <a:spAutoFit/>
+          </a:bodyPr>
+          <a:lstStyle/>
+          <a:p>
+            <a:r>
+              <a:rPr lang="en-US" sz="800" dirty="0">
+                <a:latin typeface="Calibri Light" panose="020F0302020204030204" pitchFamily="34" charset="0"/>
+                <a:cs typeface="Calibri Light" panose="020F0302020204030204" pitchFamily="34" charset="0"/>
+              </a:rPr>
+              <a:t>c</a:t>
+            </a:r>
+            <a:endParaRPr lang="en-GB" sz="800" dirty="0">
+              <a:latin typeface="Calibri Light" panose="020F0302020204030204" pitchFamily="34" charset="0"/>
+              <a:cs typeface="Calibri Light" panose="020F0302020204030204" pitchFamily="34" charset="0"/>
+            </a:endParaRPr>
+          </a:p>
+        </p:txBody>
+      </p:sp>
+      <p:sp>
+        <p:nvSpPr>
+          <p:cNvPr id="5" name="Rectangle 4">
+            <a:extLst>
+              <a:ext uri="{FF2B5EF4-FFF2-40B4-BE49-F238E27FC236}">
+                <a16:creationId xmlns:a16="http://schemas.microsoft.com/office/drawing/2014/main" id="{C28FD63F-BB9E-AD69-71B9-B973AD33F83F}"/>
+              </a:ext>
+            </a:extLst>
+          </p:cNvPr>
+          <p:cNvSpPr/>
+          <p:nvPr/>
+        </p:nvSpPr>
+        <p:spPr>
+          <a:xfrm rot="5400000">
+            <a:off x="581235" y="981465"/>
+            <a:ext cx="190946" cy="1080000"/>
+          </a:xfrm>
+          <a:prstGeom prst="rect">
+            <a:avLst/>
+          </a:prstGeom>
+          <a:noFill/>
+          <a:ln w="3175">
+            <a:noFill/>
+          </a:ln>
+        </p:spPr>
+        <p:style>
+          <a:lnRef idx="2">
+            <a:schemeClr val="accent1">
+              <a:shade val="15000"/>
+            </a:schemeClr>
+          </a:lnRef>
+          <a:fillRef idx="1">
+            <a:schemeClr val="accent1"/>
+          </a:fillRef>
+          <a:effectRef idx="0">
+            <a:schemeClr val="accent1"/>
+          </a:effectRef>
+          <a:fontRef idx="minor">
+            <a:schemeClr val="lt1"/>
+          </a:fontRef>
+        </p:style>
+        <p:txBody>
+          <a:bodyPr vert="vert270" rtlCol="0" anchor="ctr"/>
+          <a:lstStyle/>
+          <a:p>
+            <a:pPr algn="ctr"/>
+            <a:r>
+              <a:rPr lang="en-US" sz="800" dirty="0">
+                <a:solidFill>
+                  <a:schemeClr val="tx1">
+                    <a:lumMod val="75000"/>
+                    <a:lumOff val="25000"/>
+                  </a:schemeClr>
+                </a:solidFill>
+                <a:latin typeface="Calibri Light" panose="020F0302020204030204" pitchFamily="34" charset="0"/>
+                <a:cs typeface="Calibri Light" panose="020F0302020204030204" pitchFamily="34" charset="0"/>
+              </a:rPr>
+              <a:t>Refer to Figure 6.11a</a:t>
+            </a:r>
+            <a:endParaRPr lang="en-GB" sz="800" dirty="0">
+              <a:solidFill>
+                <a:schemeClr val="tx1">
+                  <a:lumMod val="75000"/>
+                  <a:lumOff val="25000"/>
+                </a:schemeClr>
+              </a:solidFill>
+              <a:latin typeface="Calibri Light" panose="020F0302020204030204" pitchFamily="34" charset="0"/>
+              <a:cs typeface="Calibri Light" panose="020F0302020204030204" pitchFamily="34" charset="0"/>
+            </a:endParaRPr>
+          </a:p>
+        </p:txBody>
+      </p:sp>
+      <p:sp>
+        <p:nvSpPr>
+          <p:cNvPr id="6" name="Rectangle 5">
+            <a:extLst>
+              <a:ext uri="{FF2B5EF4-FFF2-40B4-BE49-F238E27FC236}">
+                <a16:creationId xmlns:a16="http://schemas.microsoft.com/office/drawing/2014/main" id="{36457D3F-8BF8-12D2-AF79-76238B803265}"/>
+              </a:ext>
+            </a:extLst>
+          </p:cNvPr>
+          <p:cNvSpPr/>
+          <p:nvPr/>
+        </p:nvSpPr>
+        <p:spPr>
+          <a:xfrm rot="5400000">
+            <a:off x="2027980" y="1219383"/>
+            <a:ext cx="190946" cy="1080000"/>
+          </a:xfrm>
+          <a:prstGeom prst="rect">
+            <a:avLst/>
+          </a:prstGeom>
+          <a:noFill/>
+          <a:ln w="3175">
+            <a:noFill/>
+          </a:ln>
+        </p:spPr>
+        <p:style>
+          <a:lnRef idx="2">
+            <a:schemeClr val="accent1">
+              <a:shade val="15000"/>
+            </a:schemeClr>
+          </a:lnRef>
+          <a:fillRef idx="1">
+            <a:schemeClr val="accent1"/>
+          </a:fillRef>
+          <a:effectRef idx="0">
+            <a:schemeClr val="accent1"/>
+          </a:effectRef>
+          <a:fontRef idx="minor">
+            <a:schemeClr val="lt1"/>
+          </a:fontRef>
+        </p:style>
+        <p:txBody>
+          <a:bodyPr vert="vert270" rtlCol="0" anchor="ctr"/>
+          <a:lstStyle/>
+          <a:p>
+            <a:pPr algn="ctr"/>
+            <a:r>
+              <a:rPr lang="en-US" sz="800" dirty="0">
+                <a:solidFill>
+                  <a:schemeClr val="tx1">
+                    <a:lumMod val="75000"/>
+                    <a:lumOff val="25000"/>
+                  </a:schemeClr>
+                </a:solidFill>
+                <a:latin typeface="Calibri Light" panose="020F0302020204030204" pitchFamily="34" charset="0"/>
+                <a:cs typeface="Calibri Light" panose="020F0302020204030204" pitchFamily="34" charset="0"/>
+              </a:rPr>
+              <a:t>Refer to Figure 6.11e</a:t>
+            </a:r>
+            <a:endParaRPr lang="en-GB" sz="800" dirty="0">
+              <a:solidFill>
+                <a:schemeClr val="tx1">
+                  <a:lumMod val="75000"/>
+                  <a:lumOff val="25000"/>
+                </a:schemeClr>
+              </a:solidFill>
+              <a:latin typeface="Calibri Light" panose="020F0302020204030204" pitchFamily="34" charset="0"/>
+              <a:cs typeface="Calibri Light" panose="020F0302020204030204" pitchFamily="34" charset="0"/>
+            </a:endParaRPr>
+          </a:p>
+        </p:txBody>
+      </p:sp>
+      <p:sp>
+        <p:nvSpPr>
+          <p:cNvPr id="7" name="Rectangle 6">
+            <a:extLst>
+              <a:ext uri="{FF2B5EF4-FFF2-40B4-BE49-F238E27FC236}">
+                <a16:creationId xmlns:a16="http://schemas.microsoft.com/office/drawing/2014/main" id="{BFAC298E-30EC-6611-2990-7CB80A58CA76}"/>
+              </a:ext>
+            </a:extLst>
+          </p:cNvPr>
+          <p:cNvSpPr/>
+          <p:nvPr/>
+        </p:nvSpPr>
+        <p:spPr>
+          <a:xfrm rot="5400000">
+            <a:off x="3482769" y="964083"/>
+            <a:ext cx="190946" cy="1080000"/>
+          </a:xfrm>
+          <a:prstGeom prst="rect">
+            <a:avLst/>
+          </a:prstGeom>
+          <a:noFill/>
+          <a:ln w="3175">
+            <a:noFill/>
+          </a:ln>
+        </p:spPr>
+        <p:style>
+          <a:lnRef idx="2">
+            <a:schemeClr val="accent1">
+              <a:shade val="15000"/>
+            </a:schemeClr>
+          </a:lnRef>
+          <a:fillRef idx="1">
+            <a:schemeClr val="accent1"/>
+          </a:fillRef>
+          <a:effectRef idx="0">
+            <a:schemeClr val="accent1"/>
+          </a:effectRef>
+          <a:fontRef idx="minor">
+            <a:schemeClr val="lt1"/>
+          </a:fontRef>
+        </p:style>
+        <p:txBody>
+          <a:bodyPr vert="vert270" rtlCol="0" anchor="ctr"/>
+          <a:lstStyle/>
+          <a:p>
+            <a:pPr algn="ctr"/>
+            <a:r>
+              <a:rPr lang="en-US" sz="800" dirty="0">
+                <a:solidFill>
+                  <a:schemeClr val="tx1">
+                    <a:lumMod val="75000"/>
+                    <a:lumOff val="25000"/>
+                  </a:schemeClr>
+                </a:solidFill>
+                <a:latin typeface="Calibri Light" panose="020F0302020204030204" pitchFamily="34" charset="0"/>
+                <a:cs typeface="Calibri Light" panose="020F0302020204030204" pitchFamily="34" charset="0"/>
+              </a:rPr>
+              <a:t>Refer to </a:t>
+            </a:r>
+            <a:r>
+              <a:rPr lang="en-US" sz="800">
+                <a:solidFill>
+                  <a:schemeClr val="tx1">
+                    <a:lumMod val="75000"/>
+                    <a:lumOff val="25000"/>
+                  </a:schemeClr>
+                </a:solidFill>
+                <a:latin typeface="Calibri Light" panose="020F0302020204030204" pitchFamily="34" charset="0"/>
+                <a:cs typeface="Calibri Light" panose="020F0302020204030204" pitchFamily="34" charset="0"/>
+              </a:rPr>
+              <a:t>Figure 6.11i</a:t>
+            </a:r>
+            <a:endParaRPr lang="en-GB" sz="800" dirty="0">
+              <a:solidFill>
+                <a:schemeClr val="tx1">
+                  <a:lumMod val="75000"/>
+                  <a:lumOff val="25000"/>
+                </a:schemeClr>
+              </a:solidFill>
+              <a:latin typeface="Calibri Light" panose="020F0302020204030204" pitchFamily="34" charset="0"/>
+              <a:cs typeface="Calibri Light" panose="020F0302020204030204" pitchFamily="34" charset="0"/>
+            </a:endParaRPr>
+          </a:p>
+        </p:txBody>
+      </p:sp>
     </p:spTree>
     <p:extLst>
       <p:ext uri="{BB962C8B-B14F-4D97-AF65-F5344CB8AC3E}">
         <p14:creationId xmlns:p14="http://schemas.microsoft.com/office/powerpoint/2010/main" val="3829304072"/>
-      </p:ext>
-    </p:extLst>
-  </p:cSld>
-  <p:clrMapOvr>
-    <a:masterClrMapping/>
-  </p:clrMapOvr>
-</p:sld>
-</file>
-
-<file path=ppt/slides/slide2.xml><?xml version="1.0" encoding="utf-8"?>
-<p:sld xmlns:a="http://schemas.openxmlformats.org/drawingml/2006/main" xmlns:r="http://schemas.openxmlformats.org/officeDocument/2006/relationships" xmlns:p="http://schemas.openxmlformats.org/presentationml/2006/main">
-  <p:cSld>
-    <p:spTree>
-      <p:nvGrpSpPr>
-        <p:cNvPr id="1" name=""/>
-        <p:cNvGrpSpPr/>
-        <p:nvPr/>
-      </p:nvGrpSpPr>
-      <p:grpSpPr>
-        <a:xfrm>
-          <a:off x="0" y="0"/>
-          <a:ext cx="0" cy="0"/>
-          <a:chOff x="0" y="0"/>
-          <a:chExt cx="0" cy="0"/>
-        </a:xfrm>
-      </p:grpSpPr>
-    </p:spTree>
-    <p:extLst>
-      <p:ext uri="{BB962C8B-B14F-4D97-AF65-F5344CB8AC3E}">
-        <p14:creationId xmlns:p14="http://schemas.microsoft.com/office/powerpoint/2010/main" val="494028979"/>
       </p:ext>
     </p:extLst>
   </p:cSld>

</xml_diff>